<commit_message>
Added new cover image/slide
</commit_message>
<xml_diff>
--- a/img/cover.pptx
+++ b/img/cover.pptx
@@ -5,13 +5,14 @@
     <p:sldMasterId id="2147483648" r:id="rId1"/>
   </p:sldMasterIdLst>
   <p:notesMasterIdLst>
-    <p:notesMasterId r:id="rId3"/>
+    <p:notesMasterId r:id="rId4"/>
   </p:notesMasterIdLst>
   <p:handoutMasterIdLst>
-    <p:handoutMasterId r:id="rId4"/>
+    <p:handoutMasterId r:id="rId5"/>
   </p:handoutMasterIdLst>
   <p:sldIdLst>
     <p:sldId id="1085" r:id="rId2"/>
+    <p:sldId id="1086" r:id="rId3"/>
   </p:sldIdLst>
   <p:sldSz cx="12192000" cy="6858000"/>
   <p:notesSz cx="6858000" cy="9144000"/>
@@ -112,7 +113,7 @@
   </p:defaultTextStyle>
   <p:extLst>
     <p:ext uri="{EFAFB233-063F-42B5-8137-9DF3F51BA10A}">
-      <p15:sldGuideLst xmlns:p15="http://schemas.microsoft.com/office/powerpoint/2012/main" xmlns="">
+      <p15:sldGuideLst xmlns="" xmlns:p15="http://schemas.microsoft.com/office/powerpoint/2012/main">
         <p15:guide id="1" orient="horz" pos="3984" userDrawn="1">
           <p15:clr>
             <a:srgbClr val="A4A3A4"/>
@@ -182,7 +183,7 @@
           <p:cNvPr id="2" name="Header Placeholder 1">
             <a:extLst>
               <a:ext uri="{FF2B5EF4-FFF2-40B4-BE49-F238E27FC236}">
-                <a16:creationId xmlns:a16="http://schemas.microsoft.com/office/drawing/2014/main" xmlns="" id="{BFB1F819-490B-42CF-9D5F-C89B450ADC90}"/>
+                <a16:creationId xmlns="" xmlns:a16="http://schemas.microsoft.com/office/drawing/2014/main" id="{BFB1F819-490B-42CF-9D5F-C89B450ADC90}"/>
               </a:ext>
             </a:extLst>
           </p:cNvPr>
@@ -219,7 +220,7 @@
           <p:cNvPr id="3" name="Date Placeholder 2">
             <a:extLst>
               <a:ext uri="{FF2B5EF4-FFF2-40B4-BE49-F238E27FC236}">
-                <a16:creationId xmlns:a16="http://schemas.microsoft.com/office/drawing/2014/main" xmlns="" id="{DE801F89-2EB2-43D6-937C-2E75177F3D75}"/>
+                <a16:creationId xmlns="" xmlns:a16="http://schemas.microsoft.com/office/drawing/2014/main" id="{DE801F89-2EB2-43D6-937C-2E75177F3D75}"/>
               </a:ext>
             </a:extLst>
           </p:cNvPr>
@@ -249,7 +250,7 @@
           <a:p>
             <a:fld id="{893BB725-97BB-4599-AE7B-2D1977BDC56B}" type="datetimeFigureOut">
               <a:rPr lang="en-IN" smtClean="0"/>
-              <a:t>23/2/20</a:t>
+              <a:t>8/4/20</a:t>
             </a:fld>
             <a:endParaRPr lang="en-IN"/>
           </a:p>
@@ -260,7 +261,7 @@
           <p:cNvPr id="4" name="Footer Placeholder 3">
             <a:extLst>
               <a:ext uri="{FF2B5EF4-FFF2-40B4-BE49-F238E27FC236}">
-                <a16:creationId xmlns:a16="http://schemas.microsoft.com/office/drawing/2014/main" xmlns="" id="{5E74776E-CE4A-4D36-9FD3-20344E19A3D6}"/>
+                <a16:creationId xmlns="" xmlns:a16="http://schemas.microsoft.com/office/drawing/2014/main" id="{5E74776E-CE4A-4D36-9FD3-20344E19A3D6}"/>
               </a:ext>
             </a:extLst>
           </p:cNvPr>
@@ -297,7 +298,7 @@
           <p:cNvPr id="5" name="Slide Number Placeholder 4">
             <a:extLst>
               <a:ext uri="{FF2B5EF4-FFF2-40B4-BE49-F238E27FC236}">
-                <a16:creationId xmlns:a16="http://schemas.microsoft.com/office/drawing/2014/main" xmlns="" id="{2889EE0D-C3B8-4680-A1F5-1BD5B834EFE0}"/>
+                <a16:creationId xmlns="" xmlns:a16="http://schemas.microsoft.com/office/drawing/2014/main" id="{2889EE0D-C3B8-4680-A1F5-1BD5B834EFE0}"/>
               </a:ext>
             </a:extLst>
           </p:cNvPr>
@@ -427,7 +428,7 @@
           <a:p>
             <a:fld id="{D128A4F2-9908-430B-9DA3-607B920C1017}" type="datetimeFigureOut">
               <a:rPr lang="en-US" smtClean="0"/>
-              <a:t>23/2/20</a:t>
+              <a:t>8/4/20</a:t>
             </a:fld>
             <a:endParaRPr lang="en-US"/>
           </a:p>
@@ -798,6 +799,109 @@
 </p:notes>
 </file>
 
+<file path=ppt/notesSlides/notesSlide2.xml><?xml version="1.0" encoding="utf-8"?>
+<p:notes xmlns:a="http://schemas.openxmlformats.org/drawingml/2006/main" xmlns:r="http://schemas.openxmlformats.org/officeDocument/2006/relationships" xmlns:p="http://schemas.openxmlformats.org/presentationml/2006/main">
+  <p:cSld>
+    <p:spTree>
+      <p:nvGrpSpPr>
+        <p:cNvPr id="1" name=""/>
+        <p:cNvGrpSpPr/>
+        <p:nvPr/>
+      </p:nvGrpSpPr>
+      <p:grpSpPr>
+        <a:xfrm>
+          <a:off x="0" y="0"/>
+          <a:ext cx="0" cy="0"/>
+          <a:chOff x="0" y="0"/>
+          <a:chExt cx="0" cy="0"/>
+        </a:xfrm>
+      </p:grpSpPr>
+      <p:sp>
+        <p:nvSpPr>
+          <p:cNvPr id="2" name="Slide Image Placeholder 1"/>
+          <p:cNvSpPr>
+            <a:spLocks noGrp="1" noRot="1" noChangeAspect="1"/>
+          </p:cNvSpPr>
+          <p:nvPr>
+            <p:ph type="sldImg"/>
+          </p:nvPr>
+        </p:nvSpPr>
+        <p:spPr/>
+      </p:sp>
+      <p:sp>
+        <p:nvSpPr>
+          <p:cNvPr id="3" name="Notes Placeholder 2"/>
+          <p:cNvSpPr>
+            <a:spLocks noGrp="1"/>
+          </p:cNvSpPr>
+          <p:nvPr>
+            <p:ph type="body" idx="1"/>
+          </p:nvPr>
+        </p:nvSpPr>
+        <p:spPr/>
+        <p:txBody>
+          <a:bodyPr/>
+          <a:lstStyle/>
+          <a:p>
+            <a:endParaRPr lang="en-US" dirty="0"/>
+          </a:p>
+        </p:txBody>
+      </p:sp>
+      <p:sp>
+        <p:nvSpPr>
+          <p:cNvPr id="4" name="Footer Placeholder 3"/>
+          <p:cNvSpPr>
+            <a:spLocks noGrp="1"/>
+          </p:cNvSpPr>
+          <p:nvPr>
+            <p:ph type="ftr" sz="quarter" idx="4"/>
+          </p:nvPr>
+        </p:nvSpPr>
+        <p:spPr/>
+        <p:txBody>
+          <a:bodyPr/>
+          <a:lstStyle/>
+          <a:p>
+            <a:endParaRPr lang="en-US"/>
+          </a:p>
+        </p:txBody>
+      </p:sp>
+      <p:sp>
+        <p:nvSpPr>
+          <p:cNvPr id="5" name="Slide Number Placeholder 4"/>
+          <p:cNvSpPr>
+            <a:spLocks noGrp="1"/>
+          </p:cNvSpPr>
+          <p:nvPr>
+            <p:ph type="sldNum" sz="quarter" idx="5"/>
+          </p:nvPr>
+        </p:nvSpPr>
+        <p:spPr/>
+        <p:txBody>
+          <a:bodyPr/>
+          <a:lstStyle/>
+          <a:p>
+            <a:fld id="{F59EAF99-FF1D-40EA-B04A-652998394D1A}" type="slidenum">
+              <a:rPr lang="en-US" smtClean="0"/>
+              <a:t>2</a:t>
+            </a:fld>
+            <a:endParaRPr lang="en-US"/>
+          </a:p>
+        </p:txBody>
+      </p:sp>
+    </p:spTree>
+    <p:extLst>
+      <p:ext uri="{BB962C8B-B14F-4D97-AF65-F5344CB8AC3E}">
+        <p14:creationId xmlns:p14="http://schemas.microsoft.com/office/powerpoint/2010/main" val="730871479"/>
+      </p:ext>
+    </p:extLst>
+  </p:cSld>
+  <p:clrMapOvr>
+    <a:masterClrMapping/>
+  </p:clrMapOvr>
+</p:notes>
+</file>
+
 <file path=ppt/slideLayouts/slideLayout1.xml><?xml version="1.0" encoding="utf-8"?>
 <p:sldLayout xmlns:a="http://schemas.openxmlformats.org/drawingml/2006/main" xmlns:r="http://schemas.openxmlformats.org/officeDocument/2006/relationships" xmlns:p="http://schemas.openxmlformats.org/presentationml/2006/main" preserve="1" userDrawn="1">
   <p:cSld name="Title Slide">
@@ -820,7 +924,7 @@
           <p:cNvPr id="2" name="Title 1">
             <a:extLst>
               <a:ext uri="{FF2B5EF4-FFF2-40B4-BE49-F238E27FC236}">
-                <a16:creationId xmlns:a16="http://schemas.microsoft.com/office/drawing/2014/main" xmlns="" id="{DDAFD859-7B3A-4D41-A6F8-82D5A5BA25F3}"/>
+                <a16:creationId xmlns="" xmlns:a16="http://schemas.microsoft.com/office/drawing/2014/main" id="{DDAFD859-7B3A-4D41-A6F8-82D5A5BA25F3}"/>
               </a:ext>
             </a:extLst>
           </p:cNvPr>
@@ -857,7 +961,7 @@
           <p:cNvPr id="3" name="Subtitle 2">
             <a:extLst>
               <a:ext uri="{FF2B5EF4-FFF2-40B4-BE49-F238E27FC236}">
-                <a16:creationId xmlns:a16="http://schemas.microsoft.com/office/drawing/2014/main" xmlns="" id="{5155B2F5-F201-4E81-8777-E402DAC910C4}"/>
+                <a16:creationId xmlns="" xmlns:a16="http://schemas.microsoft.com/office/drawing/2014/main" id="{5155B2F5-F201-4E81-8777-E402DAC910C4}"/>
               </a:ext>
             </a:extLst>
           </p:cNvPr>
@@ -957,7 +1061,7 @@
           <p:cNvPr id="2" name="Title 1">
             <a:extLst>
               <a:ext uri="{FF2B5EF4-FFF2-40B4-BE49-F238E27FC236}">
-                <a16:creationId xmlns:a16="http://schemas.microsoft.com/office/drawing/2014/main" xmlns="" id="{50B12CA5-202A-482A-A3C9-064FABF5C130}"/>
+                <a16:creationId xmlns="" xmlns:a16="http://schemas.microsoft.com/office/drawing/2014/main" id="{50B12CA5-202A-482A-A3C9-064FABF5C130}"/>
               </a:ext>
             </a:extLst>
           </p:cNvPr>
@@ -985,7 +1089,7 @@
           <p:cNvPr id="3" name="Vertical Text Placeholder 2">
             <a:extLst>
               <a:ext uri="{FF2B5EF4-FFF2-40B4-BE49-F238E27FC236}">
-                <a16:creationId xmlns:a16="http://schemas.microsoft.com/office/drawing/2014/main" xmlns="" id="{3B153A61-D4E8-4FE2-B031-2B57BEBA32FA}"/>
+                <a16:creationId xmlns="" xmlns:a16="http://schemas.microsoft.com/office/drawing/2014/main" id="{3B153A61-D4E8-4FE2-B031-2B57BEBA32FA}"/>
               </a:ext>
             </a:extLst>
           </p:cNvPr>
@@ -1042,7 +1146,7 @@
           <p:cNvPr id="4" name="Date Placeholder 3">
             <a:extLst>
               <a:ext uri="{FF2B5EF4-FFF2-40B4-BE49-F238E27FC236}">
-                <a16:creationId xmlns:a16="http://schemas.microsoft.com/office/drawing/2014/main" xmlns="" id="{419F5EB2-3E36-4F00-997A-5F80E5BAC658}"/>
+                <a16:creationId xmlns="" xmlns:a16="http://schemas.microsoft.com/office/drawing/2014/main" id="{419F5EB2-3E36-4F00-997A-5F80E5BAC658}"/>
               </a:ext>
             </a:extLst>
           </p:cNvPr>
@@ -1067,7 +1171,7 @@
           <p:cNvPr id="5" name="Footer Placeholder 4">
             <a:extLst>
               <a:ext uri="{FF2B5EF4-FFF2-40B4-BE49-F238E27FC236}">
-                <a16:creationId xmlns:a16="http://schemas.microsoft.com/office/drawing/2014/main" xmlns="" id="{9C701351-D45C-45D5-9B9F-C73EF62F8845}"/>
+                <a16:creationId xmlns="" xmlns:a16="http://schemas.microsoft.com/office/drawing/2014/main" id="{9C701351-D45C-45D5-9B9F-C73EF62F8845}"/>
               </a:ext>
             </a:extLst>
           </p:cNvPr>
@@ -1122,7 +1226,7 @@
           <p:cNvPr id="2" name="Vertical Title 1">
             <a:extLst>
               <a:ext uri="{FF2B5EF4-FFF2-40B4-BE49-F238E27FC236}">
-                <a16:creationId xmlns:a16="http://schemas.microsoft.com/office/drawing/2014/main" xmlns="" id="{1E8BC861-7F24-4821-9CB7-D7FC6E0A44A6}"/>
+                <a16:creationId xmlns="" xmlns:a16="http://schemas.microsoft.com/office/drawing/2014/main" id="{1E8BC861-7F24-4821-9CB7-D7FC6E0A44A6}"/>
               </a:ext>
             </a:extLst>
           </p:cNvPr>
@@ -1155,7 +1259,7 @@
           <p:cNvPr id="3" name="Vertical Text Placeholder 2">
             <a:extLst>
               <a:ext uri="{FF2B5EF4-FFF2-40B4-BE49-F238E27FC236}">
-                <a16:creationId xmlns:a16="http://schemas.microsoft.com/office/drawing/2014/main" xmlns="" id="{8A671086-DB67-406B-8EBE-FBEF8F0137A0}"/>
+                <a16:creationId xmlns="" xmlns:a16="http://schemas.microsoft.com/office/drawing/2014/main" id="{8A671086-DB67-406B-8EBE-FBEF8F0137A0}"/>
               </a:ext>
             </a:extLst>
           </p:cNvPr>
@@ -1217,7 +1321,7 @@
           <p:cNvPr id="4" name="Date Placeholder 3">
             <a:extLst>
               <a:ext uri="{FF2B5EF4-FFF2-40B4-BE49-F238E27FC236}">
-                <a16:creationId xmlns:a16="http://schemas.microsoft.com/office/drawing/2014/main" xmlns="" id="{4A8B786D-6882-4FB8-84E5-BD29F89DF2B9}"/>
+                <a16:creationId xmlns="" xmlns:a16="http://schemas.microsoft.com/office/drawing/2014/main" id="{4A8B786D-6882-4FB8-84E5-BD29F89DF2B9}"/>
               </a:ext>
             </a:extLst>
           </p:cNvPr>
@@ -1242,7 +1346,7 @@
           <p:cNvPr id="5" name="Footer Placeholder 4">
             <a:extLst>
               <a:ext uri="{FF2B5EF4-FFF2-40B4-BE49-F238E27FC236}">
-                <a16:creationId xmlns:a16="http://schemas.microsoft.com/office/drawing/2014/main" xmlns="" id="{1A402990-1AA1-4514-B49F-F78207CA6578}"/>
+                <a16:creationId xmlns="" xmlns:a16="http://schemas.microsoft.com/office/drawing/2014/main" id="{1A402990-1AA1-4514-B49F-F78207CA6578}"/>
               </a:ext>
             </a:extLst>
           </p:cNvPr>
@@ -1297,7 +1401,7 @@
           <p:cNvPr id="3" name="Content Placeholder 2">
             <a:extLst>
               <a:ext uri="{FF2B5EF4-FFF2-40B4-BE49-F238E27FC236}">
-                <a16:creationId xmlns:a16="http://schemas.microsoft.com/office/drawing/2014/main" xmlns="" id="{F1CD68E2-1139-4707-A3DE-C7B3F54E2FCD}"/>
+                <a16:creationId xmlns="" xmlns:a16="http://schemas.microsoft.com/office/drawing/2014/main" id="{F1CD68E2-1139-4707-A3DE-C7B3F54E2FCD}"/>
               </a:ext>
             </a:extLst>
           </p:cNvPr>
@@ -1354,7 +1458,7 @@
           <p:cNvPr id="8" name="Date Placeholder 7">
             <a:extLst>
               <a:ext uri="{FF2B5EF4-FFF2-40B4-BE49-F238E27FC236}">
-                <a16:creationId xmlns:a16="http://schemas.microsoft.com/office/drawing/2014/main" xmlns="" id="{D9A9971E-3FDB-4572-8FF2-DF385C168C1C}"/>
+                <a16:creationId xmlns="" xmlns:a16="http://schemas.microsoft.com/office/drawing/2014/main" id="{D9A9971E-3FDB-4572-8FF2-DF385C168C1C}"/>
               </a:ext>
             </a:extLst>
           </p:cNvPr>
@@ -1379,7 +1483,7 @@
           <p:cNvPr id="9" name="Footer Placeholder 8">
             <a:extLst>
               <a:ext uri="{FF2B5EF4-FFF2-40B4-BE49-F238E27FC236}">
-                <a16:creationId xmlns:a16="http://schemas.microsoft.com/office/drawing/2014/main" xmlns="" id="{4B20F608-B8A7-44B7-AA50-EA2398CA640E}"/>
+                <a16:creationId xmlns="" xmlns:a16="http://schemas.microsoft.com/office/drawing/2014/main" id="{4B20F608-B8A7-44B7-AA50-EA2398CA640E}"/>
               </a:ext>
             </a:extLst>
           </p:cNvPr>
@@ -1404,7 +1508,7 @@
           <p:cNvPr id="11" name="Title 10">
             <a:extLst>
               <a:ext uri="{FF2B5EF4-FFF2-40B4-BE49-F238E27FC236}">
-                <a16:creationId xmlns:a16="http://schemas.microsoft.com/office/drawing/2014/main" xmlns="" id="{27698836-C807-4DE6-986C-B5FF96A8405C}"/>
+                <a16:creationId xmlns="" xmlns:a16="http://schemas.microsoft.com/office/drawing/2014/main" id="{27698836-C807-4DE6-986C-B5FF96A8405C}"/>
               </a:ext>
             </a:extLst>
           </p:cNvPr>
@@ -1463,7 +1567,7 @@
           <p:cNvPr id="2" name="Title 1">
             <a:extLst>
               <a:ext uri="{FF2B5EF4-FFF2-40B4-BE49-F238E27FC236}">
-                <a16:creationId xmlns:a16="http://schemas.microsoft.com/office/drawing/2014/main" xmlns="" id="{A143C5A4-9FB1-4671-9B03-77E61F653AA2}"/>
+                <a16:creationId xmlns="" xmlns:a16="http://schemas.microsoft.com/office/drawing/2014/main" id="{A143C5A4-9FB1-4671-9B03-77E61F653AA2}"/>
               </a:ext>
             </a:extLst>
           </p:cNvPr>
@@ -1500,7 +1604,7 @@
           <p:cNvPr id="3" name="Text Placeholder 2">
             <a:extLst>
               <a:ext uri="{FF2B5EF4-FFF2-40B4-BE49-F238E27FC236}">
-                <a16:creationId xmlns:a16="http://schemas.microsoft.com/office/drawing/2014/main" xmlns="" id="{52CCD71A-D7B9-40B5-A9CE-9145B0D9FA2A}"/>
+                <a16:creationId xmlns="" xmlns:a16="http://schemas.microsoft.com/office/drawing/2014/main" id="{52CCD71A-D7B9-40B5-A9CE-9145B0D9FA2A}"/>
               </a:ext>
             </a:extLst>
           </p:cNvPr>
@@ -1625,7 +1729,7 @@
           <p:cNvPr id="4" name="Date Placeholder 3">
             <a:extLst>
               <a:ext uri="{FF2B5EF4-FFF2-40B4-BE49-F238E27FC236}">
-                <a16:creationId xmlns:a16="http://schemas.microsoft.com/office/drawing/2014/main" xmlns="" id="{3596BCB7-9AFE-41E2-8362-87976EED4838}"/>
+                <a16:creationId xmlns="" xmlns:a16="http://schemas.microsoft.com/office/drawing/2014/main" id="{3596BCB7-9AFE-41E2-8362-87976EED4838}"/>
               </a:ext>
             </a:extLst>
           </p:cNvPr>
@@ -1650,7 +1754,7 @@
           <p:cNvPr id="5" name="Footer Placeholder 4">
             <a:extLst>
               <a:ext uri="{FF2B5EF4-FFF2-40B4-BE49-F238E27FC236}">
-                <a16:creationId xmlns:a16="http://schemas.microsoft.com/office/drawing/2014/main" xmlns="" id="{2AE84B6A-8664-45F8-BFD9-7852B1CCE0BE}"/>
+                <a16:creationId xmlns="" xmlns:a16="http://schemas.microsoft.com/office/drawing/2014/main" id="{2AE84B6A-8664-45F8-BFD9-7852B1CCE0BE}"/>
               </a:ext>
             </a:extLst>
           </p:cNvPr>
@@ -1705,7 +1809,7 @@
           <p:cNvPr id="2" name="Title 1">
             <a:extLst>
               <a:ext uri="{FF2B5EF4-FFF2-40B4-BE49-F238E27FC236}">
-                <a16:creationId xmlns:a16="http://schemas.microsoft.com/office/drawing/2014/main" xmlns="" id="{8E55DCE4-3CB8-4D23-8475-372E68C69B83}"/>
+                <a16:creationId xmlns="" xmlns:a16="http://schemas.microsoft.com/office/drawing/2014/main" id="{8E55DCE4-3CB8-4D23-8475-372E68C69B83}"/>
               </a:ext>
             </a:extLst>
           </p:cNvPr>
@@ -1733,7 +1837,7 @@
           <p:cNvPr id="3" name="Content Placeholder 2">
             <a:extLst>
               <a:ext uri="{FF2B5EF4-FFF2-40B4-BE49-F238E27FC236}">
-                <a16:creationId xmlns:a16="http://schemas.microsoft.com/office/drawing/2014/main" xmlns="" id="{B4A61942-044B-43C1-B3E5-F7DA2A759AF7}"/>
+                <a16:creationId xmlns="" xmlns:a16="http://schemas.microsoft.com/office/drawing/2014/main" id="{B4A61942-044B-43C1-B3E5-F7DA2A759AF7}"/>
               </a:ext>
             </a:extLst>
           </p:cNvPr>
@@ -1795,7 +1899,7 @@
           <p:cNvPr id="4" name="Content Placeholder 3">
             <a:extLst>
               <a:ext uri="{FF2B5EF4-FFF2-40B4-BE49-F238E27FC236}">
-                <a16:creationId xmlns:a16="http://schemas.microsoft.com/office/drawing/2014/main" xmlns="" id="{DB821979-02DE-4367-9DE2-46F6D57B2BFD}"/>
+                <a16:creationId xmlns="" xmlns:a16="http://schemas.microsoft.com/office/drawing/2014/main" id="{DB821979-02DE-4367-9DE2-46F6D57B2BFD}"/>
               </a:ext>
             </a:extLst>
           </p:cNvPr>
@@ -1857,7 +1961,7 @@
           <p:cNvPr id="5" name="Date Placeholder 4">
             <a:extLst>
               <a:ext uri="{FF2B5EF4-FFF2-40B4-BE49-F238E27FC236}">
-                <a16:creationId xmlns:a16="http://schemas.microsoft.com/office/drawing/2014/main" xmlns="" id="{3CFF7250-CDD2-4481-8ED2-B0AFF55C2A03}"/>
+                <a16:creationId xmlns="" xmlns:a16="http://schemas.microsoft.com/office/drawing/2014/main" id="{3CFF7250-CDD2-4481-8ED2-B0AFF55C2A03}"/>
               </a:ext>
             </a:extLst>
           </p:cNvPr>
@@ -1882,7 +1986,7 @@
           <p:cNvPr id="6" name="Footer Placeholder 5">
             <a:extLst>
               <a:ext uri="{FF2B5EF4-FFF2-40B4-BE49-F238E27FC236}">
-                <a16:creationId xmlns:a16="http://schemas.microsoft.com/office/drawing/2014/main" xmlns="" id="{A3BE5883-C386-4BBE-BEC1-21DF8D820D2D}"/>
+                <a16:creationId xmlns="" xmlns:a16="http://schemas.microsoft.com/office/drawing/2014/main" id="{A3BE5883-C386-4BBE-BEC1-21DF8D820D2D}"/>
               </a:ext>
             </a:extLst>
           </p:cNvPr>
@@ -1937,7 +2041,7 @@
           <p:cNvPr id="2" name="Title 1">
             <a:extLst>
               <a:ext uri="{FF2B5EF4-FFF2-40B4-BE49-F238E27FC236}">
-                <a16:creationId xmlns:a16="http://schemas.microsoft.com/office/drawing/2014/main" xmlns="" id="{2E2B3E8E-C047-4D3D-941E-B259ECAD2B1C}"/>
+                <a16:creationId xmlns="" xmlns:a16="http://schemas.microsoft.com/office/drawing/2014/main" id="{2E2B3E8E-C047-4D3D-941E-B259ECAD2B1C}"/>
               </a:ext>
             </a:extLst>
           </p:cNvPr>
@@ -1970,7 +2074,7 @@
           <p:cNvPr id="3" name="Text Placeholder 2">
             <a:extLst>
               <a:ext uri="{FF2B5EF4-FFF2-40B4-BE49-F238E27FC236}">
-                <a16:creationId xmlns:a16="http://schemas.microsoft.com/office/drawing/2014/main" xmlns="" id="{F544E061-706B-4A2A-8E53-200AC7E63A33}"/>
+                <a16:creationId xmlns="" xmlns:a16="http://schemas.microsoft.com/office/drawing/2014/main" id="{F544E061-706B-4A2A-8E53-200AC7E63A33}"/>
               </a:ext>
             </a:extLst>
           </p:cNvPr>
@@ -2041,7 +2145,7 @@
           <p:cNvPr id="4" name="Content Placeholder 3">
             <a:extLst>
               <a:ext uri="{FF2B5EF4-FFF2-40B4-BE49-F238E27FC236}">
-                <a16:creationId xmlns:a16="http://schemas.microsoft.com/office/drawing/2014/main" xmlns="" id="{E5DB9C07-D67E-44CC-BF5A-E7120281D8C4}"/>
+                <a16:creationId xmlns="" xmlns:a16="http://schemas.microsoft.com/office/drawing/2014/main" id="{E5DB9C07-D67E-44CC-BF5A-E7120281D8C4}"/>
               </a:ext>
             </a:extLst>
           </p:cNvPr>
@@ -2103,7 +2207,7 @@
           <p:cNvPr id="5" name="Text Placeholder 4">
             <a:extLst>
               <a:ext uri="{FF2B5EF4-FFF2-40B4-BE49-F238E27FC236}">
-                <a16:creationId xmlns:a16="http://schemas.microsoft.com/office/drawing/2014/main" xmlns="" id="{EFB69EBA-9581-40D9-A5CD-4586466F08A0}"/>
+                <a16:creationId xmlns="" xmlns:a16="http://schemas.microsoft.com/office/drawing/2014/main" id="{EFB69EBA-9581-40D9-A5CD-4586466F08A0}"/>
               </a:ext>
             </a:extLst>
           </p:cNvPr>
@@ -2174,7 +2278,7 @@
           <p:cNvPr id="6" name="Content Placeholder 5">
             <a:extLst>
               <a:ext uri="{FF2B5EF4-FFF2-40B4-BE49-F238E27FC236}">
-                <a16:creationId xmlns:a16="http://schemas.microsoft.com/office/drawing/2014/main" xmlns="" id="{C12892CF-7212-4B40-9A1F-FBE0B5A6E487}"/>
+                <a16:creationId xmlns="" xmlns:a16="http://schemas.microsoft.com/office/drawing/2014/main" id="{C12892CF-7212-4B40-9A1F-FBE0B5A6E487}"/>
               </a:ext>
             </a:extLst>
           </p:cNvPr>
@@ -2236,7 +2340,7 @@
           <p:cNvPr id="8" name="Footer Placeholder 7">
             <a:extLst>
               <a:ext uri="{FF2B5EF4-FFF2-40B4-BE49-F238E27FC236}">
-                <a16:creationId xmlns:a16="http://schemas.microsoft.com/office/drawing/2014/main" xmlns="" id="{3C38008C-1D97-4898-9BBB-138D93781116}"/>
+                <a16:creationId xmlns="" xmlns:a16="http://schemas.microsoft.com/office/drawing/2014/main" id="{3C38008C-1D97-4898-9BBB-138D93781116}"/>
               </a:ext>
             </a:extLst>
           </p:cNvPr>
@@ -2291,7 +2395,7 @@
           <p:cNvPr id="2" name="Title 1">
             <a:extLst>
               <a:ext uri="{FF2B5EF4-FFF2-40B4-BE49-F238E27FC236}">
-                <a16:creationId xmlns:a16="http://schemas.microsoft.com/office/drawing/2014/main" xmlns="" id="{E0B4112A-E3F5-4823-8615-78102EDEDD10}"/>
+                <a16:creationId xmlns="" xmlns:a16="http://schemas.microsoft.com/office/drawing/2014/main" id="{E0B4112A-E3F5-4823-8615-78102EDEDD10}"/>
               </a:ext>
             </a:extLst>
           </p:cNvPr>
@@ -2319,7 +2423,7 @@
           <p:cNvPr id="3" name="Date Placeholder 2">
             <a:extLst>
               <a:ext uri="{FF2B5EF4-FFF2-40B4-BE49-F238E27FC236}">
-                <a16:creationId xmlns:a16="http://schemas.microsoft.com/office/drawing/2014/main" xmlns="" id="{6F42A6AC-E36D-44AF-A8EE-7FDEB30822DC}"/>
+                <a16:creationId xmlns="" xmlns:a16="http://schemas.microsoft.com/office/drawing/2014/main" id="{6F42A6AC-E36D-44AF-A8EE-7FDEB30822DC}"/>
               </a:ext>
             </a:extLst>
           </p:cNvPr>
@@ -2344,7 +2448,7 @@
           <p:cNvPr id="4" name="Footer Placeholder 3">
             <a:extLst>
               <a:ext uri="{FF2B5EF4-FFF2-40B4-BE49-F238E27FC236}">
-                <a16:creationId xmlns:a16="http://schemas.microsoft.com/office/drawing/2014/main" xmlns="" id="{0157A7DB-6520-419C-BC3B-E653AB10BA5F}"/>
+                <a16:creationId xmlns="" xmlns:a16="http://schemas.microsoft.com/office/drawing/2014/main" id="{0157A7DB-6520-419C-BC3B-E653AB10BA5F}"/>
               </a:ext>
             </a:extLst>
           </p:cNvPr>
@@ -2399,7 +2503,7 @@
           <p:cNvPr id="3" name="Footer Placeholder 2">
             <a:extLst>
               <a:ext uri="{FF2B5EF4-FFF2-40B4-BE49-F238E27FC236}">
-                <a16:creationId xmlns:a16="http://schemas.microsoft.com/office/drawing/2014/main" xmlns="" id="{5D037539-5463-4D95-933D-95833F407B8A}"/>
+                <a16:creationId xmlns="" xmlns:a16="http://schemas.microsoft.com/office/drawing/2014/main" id="{5D037539-5463-4D95-933D-95833F407B8A}"/>
               </a:ext>
             </a:extLst>
           </p:cNvPr>
@@ -2454,7 +2558,7 @@
           <p:cNvPr id="2" name="Title 1">
             <a:extLst>
               <a:ext uri="{FF2B5EF4-FFF2-40B4-BE49-F238E27FC236}">
-                <a16:creationId xmlns:a16="http://schemas.microsoft.com/office/drawing/2014/main" xmlns="" id="{1D56FA80-B46B-40B1-BCF9-D7886B623096}"/>
+                <a16:creationId xmlns="" xmlns:a16="http://schemas.microsoft.com/office/drawing/2014/main" id="{1D56FA80-B46B-40B1-BCF9-D7886B623096}"/>
               </a:ext>
             </a:extLst>
           </p:cNvPr>
@@ -2491,7 +2595,7 @@
           <p:cNvPr id="3" name="Content Placeholder 2">
             <a:extLst>
               <a:ext uri="{FF2B5EF4-FFF2-40B4-BE49-F238E27FC236}">
-                <a16:creationId xmlns:a16="http://schemas.microsoft.com/office/drawing/2014/main" xmlns="" id="{22BBB2C7-3717-4664-A532-F07855583273}"/>
+                <a16:creationId xmlns="" xmlns:a16="http://schemas.microsoft.com/office/drawing/2014/main" id="{22BBB2C7-3717-4664-A532-F07855583273}"/>
               </a:ext>
             </a:extLst>
           </p:cNvPr>
@@ -2581,7 +2685,7 @@
           <p:cNvPr id="4" name="Text Placeholder 3">
             <a:extLst>
               <a:ext uri="{FF2B5EF4-FFF2-40B4-BE49-F238E27FC236}">
-                <a16:creationId xmlns:a16="http://schemas.microsoft.com/office/drawing/2014/main" xmlns="" id="{CA1376A6-B1D3-4E60-89BF-AFA482E749B2}"/>
+                <a16:creationId xmlns="" xmlns:a16="http://schemas.microsoft.com/office/drawing/2014/main" id="{CA1376A6-B1D3-4E60-89BF-AFA482E749B2}"/>
               </a:ext>
             </a:extLst>
           </p:cNvPr>
@@ -2652,7 +2756,7 @@
           <p:cNvPr id="5" name="Date Placeholder 4">
             <a:extLst>
               <a:ext uri="{FF2B5EF4-FFF2-40B4-BE49-F238E27FC236}">
-                <a16:creationId xmlns:a16="http://schemas.microsoft.com/office/drawing/2014/main" xmlns="" id="{A4D4C386-37BE-4382-B89B-DA00CA2E0DF7}"/>
+                <a16:creationId xmlns="" xmlns:a16="http://schemas.microsoft.com/office/drawing/2014/main" id="{A4D4C386-37BE-4382-B89B-DA00CA2E0DF7}"/>
               </a:ext>
             </a:extLst>
           </p:cNvPr>
@@ -2677,7 +2781,7 @@
           <p:cNvPr id="6" name="Footer Placeholder 5">
             <a:extLst>
               <a:ext uri="{FF2B5EF4-FFF2-40B4-BE49-F238E27FC236}">
-                <a16:creationId xmlns:a16="http://schemas.microsoft.com/office/drawing/2014/main" xmlns="" id="{C3D025EA-EEAE-40BC-BEF1-748192CBEB2A}"/>
+                <a16:creationId xmlns="" xmlns:a16="http://schemas.microsoft.com/office/drawing/2014/main" id="{C3D025EA-EEAE-40BC-BEF1-748192CBEB2A}"/>
               </a:ext>
             </a:extLst>
           </p:cNvPr>
@@ -2732,7 +2836,7 @@
           <p:cNvPr id="2" name="Title 1">
             <a:extLst>
               <a:ext uri="{FF2B5EF4-FFF2-40B4-BE49-F238E27FC236}">
-                <a16:creationId xmlns:a16="http://schemas.microsoft.com/office/drawing/2014/main" xmlns="" id="{3E8A9EF1-A514-4277-B1E2-E7782F4CEEF9}"/>
+                <a16:creationId xmlns="" xmlns:a16="http://schemas.microsoft.com/office/drawing/2014/main" id="{3E8A9EF1-A514-4277-B1E2-E7782F4CEEF9}"/>
               </a:ext>
             </a:extLst>
           </p:cNvPr>
@@ -2769,7 +2873,7 @@
           <p:cNvPr id="3" name="Picture Placeholder 2">
             <a:extLst>
               <a:ext uri="{FF2B5EF4-FFF2-40B4-BE49-F238E27FC236}">
-                <a16:creationId xmlns:a16="http://schemas.microsoft.com/office/drawing/2014/main" xmlns="" id="{ABA65C4A-2464-4D2A-BF84-D8F38981A00B}"/>
+                <a16:creationId xmlns="" xmlns:a16="http://schemas.microsoft.com/office/drawing/2014/main" id="{ABA65C4A-2464-4D2A-BF84-D8F38981A00B}"/>
               </a:ext>
             </a:extLst>
           </p:cNvPr>
@@ -2836,7 +2940,7 @@
           <p:cNvPr id="4" name="Text Placeholder 3">
             <a:extLst>
               <a:ext uri="{FF2B5EF4-FFF2-40B4-BE49-F238E27FC236}">
-                <a16:creationId xmlns:a16="http://schemas.microsoft.com/office/drawing/2014/main" xmlns="" id="{6CAF8DDA-451A-4FAB-88DF-5739CEE72120}"/>
+                <a16:creationId xmlns="" xmlns:a16="http://schemas.microsoft.com/office/drawing/2014/main" id="{6CAF8DDA-451A-4FAB-88DF-5739CEE72120}"/>
               </a:ext>
             </a:extLst>
           </p:cNvPr>
@@ -2907,7 +3011,7 @@
           <p:cNvPr id="5" name="Date Placeholder 4">
             <a:extLst>
               <a:ext uri="{FF2B5EF4-FFF2-40B4-BE49-F238E27FC236}">
-                <a16:creationId xmlns:a16="http://schemas.microsoft.com/office/drawing/2014/main" xmlns="" id="{68ECC280-81B9-426F-88DD-6CB66D822DBE}"/>
+                <a16:creationId xmlns="" xmlns:a16="http://schemas.microsoft.com/office/drawing/2014/main" id="{68ECC280-81B9-426F-88DD-6CB66D822DBE}"/>
               </a:ext>
             </a:extLst>
           </p:cNvPr>
@@ -2932,7 +3036,7 @@
           <p:cNvPr id="6" name="Footer Placeholder 5">
             <a:extLst>
               <a:ext uri="{FF2B5EF4-FFF2-40B4-BE49-F238E27FC236}">
-                <a16:creationId xmlns:a16="http://schemas.microsoft.com/office/drawing/2014/main" xmlns="" id="{0D29A5BE-9259-465C-A26A-72B650CBBD31}"/>
+                <a16:creationId xmlns="" xmlns:a16="http://schemas.microsoft.com/office/drawing/2014/main" id="{0D29A5BE-9259-465C-A26A-72B650CBBD31}"/>
               </a:ext>
             </a:extLst>
           </p:cNvPr>
@@ -2992,7 +3096,7 @@
           <p:cNvPr id="2" name="Title Placeholder 1">
             <a:extLst>
               <a:ext uri="{FF2B5EF4-FFF2-40B4-BE49-F238E27FC236}">
-                <a16:creationId xmlns:a16="http://schemas.microsoft.com/office/drawing/2014/main" xmlns="" id="{02B9192D-D09A-4000-A32D-A57396909D6E}"/>
+                <a16:creationId xmlns="" xmlns:a16="http://schemas.microsoft.com/office/drawing/2014/main" id="{02B9192D-D09A-4000-A32D-A57396909D6E}"/>
               </a:ext>
             </a:extLst>
           </p:cNvPr>
@@ -3030,7 +3134,7 @@
           <p:cNvPr id="3" name="Text Placeholder 2">
             <a:extLst>
               <a:ext uri="{FF2B5EF4-FFF2-40B4-BE49-F238E27FC236}">
-                <a16:creationId xmlns:a16="http://schemas.microsoft.com/office/drawing/2014/main" xmlns="" id="{EEB9DBE1-16C6-42E7-9C06-0108C3D1F029}"/>
+                <a16:creationId xmlns="" xmlns:a16="http://schemas.microsoft.com/office/drawing/2014/main" id="{EEB9DBE1-16C6-42E7-9C06-0108C3D1F029}"/>
               </a:ext>
             </a:extLst>
           </p:cNvPr>
@@ -3097,7 +3201,7 @@
           <p:cNvPr id="4" name="Date Placeholder 3">
             <a:extLst>
               <a:ext uri="{FF2B5EF4-FFF2-40B4-BE49-F238E27FC236}">
-                <a16:creationId xmlns:a16="http://schemas.microsoft.com/office/drawing/2014/main" xmlns="" id="{1250313C-1174-4368-8CB1-4DDC7B9789E2}"/>
+                <a16:creationId xmlns="" xmlns:a16="http://schemas.microsoft.com/office/drawing/2014/main" id="{1250313C-1174-4368-8CB1-4DDC7B9789E2}"/>
               </a:ext>
             </a:extLst>
           </p:cNvPr>
@@ -3140,7 +3244,7 @@
           <p:cNvPr id="5" name="Footer Placeholder 4">
             <a:extLst>
               <a:ext uri="{FF2B5EF4-FFF2-40B4-BE49-F238E27FC236}">
-                <a16:creationId xmlns:a16="http://schemas.microsoft.com/office/drawing/2014/main" xmlns="" id="{4E009F27-8620-40F1-8848-D9456B8379E3}"/>
+                <a16:creationId xmlns="" xmlns:a16="http://schemas.microsoft.com/office/drawing/2014/main" id="{4E009F27-8620-40F1-8848-D9456B8379E3}"/>
               </a:ext>
             </a:extLst>
           </p:cNvPr>
@@ -3551,7 +3655,7 @@
           <p:cNvPr id="53" name="Google Shape;263;p33">
             <a:extLst>
               <a:ext uri="{FF2B5EF4-FFF2-40B4-BE49-F238E27FC236}">
-                <a16:creationId xmlns:a16="http://schemas.microsoft.com/office/drawing/2014/main" xmlns="" id="{2811483D-CBB6-7C4B-A048-7BB317820829}"/>
+                <a16:creationId xmlns="" xmlns:a16="http://schemas.microsoft.com/office/drawing/2014/main" id="{2811483D-CBB6-7C4B-A048-7BB317820829}"/>
               </a:ext>
             </a:extLst>
           </p:cNvPr>
@@ -3584,7 +3688,7 @@
           <p:cNvPr id="54" name="Google Shape;269;p33">
             <a:extLst>
               <a:ext uri="{FF2B5EF4-FFF2-40B4-BE49-F238E27FC236}">
-                <a16:creationId xmlns:a16="http://schemas.microsoft.com/office/drawing/2014/main" xmlns="" id="{BD67E579-F1A3-3843-82FE-8F2616E38443}"/>
+                <a16:creationId xmlns="" xmlns:a16="http://schemas.microsoft.com/office/drawing/2014/main" id="{BD67E579-F1A3-3843-82FE-8F2616E38443}"/>
               </a:ext>
             </a:extLst>
           </p:cNvPr>
@@ -3621,7 +3725,7 @@
           <p:cNvPr id="55" name="Google Shape;271;p33">
             <a:extLst>
               <a:ext uri="{FF2B5EF4-FFF2-40B4-BE49-F238E27FC236}">
-                <a16:creationId xmlns:a16="http://schemas.microsoft.com/office/drawing/2014/main" xmlns="" id="{E71CEAAC-D7DA-6840-94F9-E8D3557F30C0}"/>
+                <a16:creationId xmlns="" xmlns:a16="http://schemas.microsoft.com/office/drawing/2014/main" id="{E71CEAAC-D7DA-6840-94F9-E8D3557F30C0}"/>
               </a:ext>
             </a:extLst>
           </p:cNvPr>
@@ -3658,7 +3762,7 @@
           <p:cNvPr id="56" name="Google Shape;272;p33">
             <a:extLst>
               <a:ext uri="{FF2B5EF4-FFF2-40B4-BE49-F238E27FC236}">
-                <a16:creationId xmlns:a16="http://schemas.microsoft.com/office/drawing/2014/main" xmlns="" id="{50FB8BBF-B80E-484B-9E25-F74D6D5631AF}"/>
+                <a16:creationId xmlns="" xmlns:a16="http://schemas.microsoft.com/office/drawing/2014/main" id="{50FB8BBF-B80E-484B-9E25-F74D6D5631AF}"/>
               </a:ext>
             </a:extLst>
           </p:cNvPr>
@@ -3692,7 +3796,7 @@
           <p:cNvPr id="58" name="Google Shape;265;p33">
             <a:extLst>
               <a:ext uri="{FF2B5EF4-FFF2-40B4-BE49-F238E27FC236}">
-                <a16:creationId xmlns:a16="http://schemas.microsoft.com/office/drawing/2014/main" xmlns="" id="{9CB93309-F091-5C4C-BC8F-4A658B6933D7}"/>
+                <a16:creationId xmlns="" xmlns:a16="http://schemas.microsoft.com/office/drawing/2014/main" id="{9CB93309-F091-5C4C-BC8F-4A658B6933D7}"/>
               </a:ext>
             </a:extLst>
           </p:cNvPr>
@@ -3725,7 +3829,7 @@
           <p:cNvPr id="62" name="Google Shape;270;p33">
             <a:extLst>
               <a:ext uri="{FF2B5EF4-FFF2-40B4-BE49-F238E27FC236}">
-                <a16:creationId xmlns:a16="http://schemas.microsoft.com/office/drawing/2014/main" xmlns="" id="{E33850FE-3047-C148-B25F-DF7043AB789C}"/>
+                <a16:creationId xmlns="" xmlns:a16="http://schemas.microsoft.com/office/drawing/2014/main" id="{E33850FE-3047-C148-B25F-DF7043AB789C}"/>
               </a:ext>
             </a:extLst>
           </p:cNvPr>
@@ -3816,6 +3920,128 @@
   <p:clrMapOvr>
     <a:masterClrMapping/>
   </p:clrMapOvr>
+  <p:timing>
+    <p:tnLst>
+      <p:par>
+        <p:cTn xmlns:p14="http://schemas.microsoft.com/office/powerpoint/2010/main" id="1" dur="indefinite" restart="never" nodeType="tmRoot"/>
+      </p:par>
+    </p:tnLst>
+  </p:timing>
+</p:sld>
+</file>
+
+<file path=ppt/slides/slide2.xml><?xml version="1.0" encoding="utf-8"?>
+<p:sld xmlns:a="http://schemas.openxmlformats.org/drawingml/2006/main" xmlns:r="http://schemas.openxmlformats.org/officeDocument/2006/relationships" xmlns:p="http://schemas.openxmlformats.org/presentationml/2006/main">
+  <p:cSld>
+    <p:spTree>
+      <p:nvGrpSpPr>
+        <p:cNvPr id="1" name=""/>
+        <p:cNvGrpSpPr/>
+        <p:nvPr/>
+      </p:nvGrpSpPr>
+      <p:grpSpPr>
+        <a:xfrm>
+          <a:off x="0" y="0"/>
+          <a:ext cx="0" cy="0"/>
+          <a:chOff x="0" y="0"/>
+          <a:chExt cx="0" cy="0"/>
+        </a:xfrm>
+      </p:grpSpPr>
+      <p:sp>
+        <p:nvSpPr>
+          <p:cNvPr id="2" name="Rectangle 1"/>
+          <p:cNvSpPr/>
+          <p:nvPr/>
+        </p:nvSpPr>
+        <p:spPr>
+          <a:xfrm>
+            <a:off x="0" y="0"/>
+            <a:ext cx="12192000" cy="840893"/>
+          </a:xfrm>
+          <a:prstGeom prst="rect">
+            <a:avLst/>
+          </a:prstGeom>
+          <a:solidFill>
+            <a:schemeClr val="tx1"/>
+          </a:solidFill>
+          <a:ln>
+            <a:solidFill>
+              <a:schemeClr val="tx1"/>
+            </a:solidFill>
+          </a:ln>
+        </p:spPr>
+        <p:style>
+          <a:lnRef idx="2">
+            <a:schemeClr val="dk1">
+              <a:shade val="50000"/>
+            </a:schemeClr>
+          </a:lnRef>
+          <a:fillRef idx="1">
+            <a:schemeClr val="dk1"/>
+          </a:fillRef>
+          <a:effectRef idx="0">
+            <a:schemeClr val="dk1"/>
+          </a:effectRef>
+          <a:fontRef idx="minor">
+            <a:schemeClr val="lt1"/>
+          </a:fontRef>
+        </p:style>
+        <p:txBody>
+          <a:bodyPr rtlCol="0" anchor="ctr"/>
+          <a:lstStyle/>
+          <a:p>
+            <a:pPr algn="ctr"/>
+            <a:endParaRPr lang="en-US"/>
+          </a:p>
+        </p:txBody>
+      </p:sp>
+      <p:pic>
+        <p:nvPicPr>
+          <p:cNvPr id="3" name="Picture 2"/>
+          <p:cNvPicPr>
+            <a:picLocks noChangeAspect="1"/>
+          </p:cNvPicPr>
+          <p:nvPr/>
+        </p:nvPicPr>
+        <p:blipFill>
+          <a:blip r:embed="rId3" cstate="print">
+            <a:extLst>
+              <a:ext uri="{28A0092B-C50C-407E-A947-70E740481C1C}">
+                <a14:useLocalDpi xmlns:a14="http://schemas.microsoft.com/office/drawing/2010/main" val="0"/>
+              </a:ext>
+            </a:extLst>
+          </a:blip>
+          <a:stretch>
+            <a:fillRect/>
+          </a:stretch>
+        </p:blipFill>
+        <p:spPr>
+          <a:xfrm>
+            <a:off x="5904277" y="1402114"/>
+            <a:ext cx="5340656" cy="4552757"/>
+          </a:xfrm>
+          <a:prstGeom prst="rect">
+            <a:avLst/>
+          </a:prstGeom>
+        </p:spPr>
+      </p:pic>
+    </p:spTree>
+    <p:extLst>
+      <p:ext uri="{BB962C8B-B14F-4D97-AF65-F5344CB8AC3E}">
+        <p14:creationId xmlns:p14="http://schemas.microsoft.com/office/powerpoint/2010/main" val="896618328"/>
+      </p:ext>
+    </p:extLst>
+  </p:cSld>
+  <p:clrMapOvr>
+    <a:masterClrMapping/>
+  </p:clrMapOvr>
+  <p:timing>
+    <p:tnLst>
+      <p:par>
+        <p:cTn xmlns:p14="http://schemas.microsoft.com/office/powerpoint/2010/main" id="1" dur="indefinite" restart="never" nodeType="tmRoot"/>
+      </p:par>
+    </p:tnLst>
+  </p:timing>
 </p:sld>
 </file>
 
@@ -4014,7 +4240,7 @@
   <a:extraClrSchemeLst/>
   <a:extLst>
     <a:ext uri="{05A4C25C-085E-4340-85A3-A5531E510DB2}">
-      <thm15:themeFamily xmlns:thm15="http://schemas.microsoft.com/office/thememl/2012/main" xmlns="" name="Office Theme" id="{62F939B6-93AF-4DB8-9C6B-D6C7DFDC589F}" vid="{4A3C46E8-61CC-4603-A589-7422A47A8E4A}"/>
+      <thm15:themeFamily xmlns="" xmlns:thm15="http://schemas.microsoft.com/office/thememl/2012/main" name="Office Theme" id="{62F939B6-93AF-4DB8-9C6B-D6C7DFDC589F}" vid="{4A3C46E8-61CC-4603-A589-7422A47A8E4A}"/>
     </a:ext>
   </a:extLst>
 </a:theme>
@@ -4309,7 +4535,7 @@
   <a:extraClrSchemeLst/>
   <a:extLst>
     <a:ext uri="{05A4C25C-085E-4340-85A3-A5531E510DB2}">
-      <thm15:themeFamily xmlns:thm15="http://schemas.microsoft.com/office/thememl/2012/main" xmlns="" name="Office Theme" id="{62F939B6-93AF-4DB8-9C6B-D6C7DFDC589F}" vid="{4A3C46E8-61CC-4603-A589-7422A47A8E4A}"/>
+      <thm15:themeFamily xmlns="" xmlns:thm15="http://schemas.microsoft.com/office/thememl/2012/main" name="Office Theme" id="{62F939B6-93AF-4DB8-9C6B-D6C7DFDC589F}" vid="{4A3C46E8-61CC-4603-A589-7422A47A8E4A}"/>
     </a:ext>
   </a:extLst>
 </a:theme>
@@ -4604,7 +4830,7 @@
   <a:extraClrSchemeLst/>
   <a:extLst>
     <a:ext uri="{05A4C25C-085E-4340-85A3-A5531E510DB2}">
-      <thm15:themeFamily xmlns:thm15="http://schemas.microsoft.com/office/thememl/2012/main" xmlns="" name="Office Theme" id="{62F939B6-93AF-4DB8-9C6B-D6C7DFDC589F}" vid="{4A3C46E8-61CC-4603-A589-7422A47A8E4A}"/>
+      <thm15:themeFamily xmlns="" xmlns:thm15="http://schemas.microsoft.com/office/thememl/2012/main" name="Office Theme" id="{62F939B6-93AF-4DB8-9C6B-D6C7DFDC589F}" vid="{4A3C46E8-61CC-4603-A589-7422A47A8E4A}"/>
     </a:ext>
   </a:extLst>
 </a:theme>

</xml_diff>